<commit_message>
Réecriture du fichier d'information sur les tests.
</commit_message>
<xml_diff>
--- a/Doc/EasyBid.pptx
+++ b/Doc/EasyBid.pptx
@@ -5728,7 +5728,15 @@
             </a:r>
             <a:r>
               <a:rPr lang="fr-FR" b="1" dirty="0" smtClean="0"/>
-              <a:t> – test – readmeTestingInfo.txt</a:t>
+              <a:t> – </a:t>
+            </a:r>
+            <a:r>
+              <a:rPr lang="fr-FR" b="1" dirty="0" smtClean="0"/>
+              <a:t>test – </a:t>
+            </a:r>
+            <a:r>
+              <a:rPr lang="fr-FR" b="1" dirty="0" smtClean="0"/>
+              <a:t>readmeTestingInfo.txt</a:t>
             </a:r>
           </a:p>
         </p:txBody>
@@ -5838,31 +5846,43 @@
               <a:t> </a:t>
             </a:r>
             <a:r>
+              <a:rPr lang="fr-FR" dirty="0" err="1"/>
+              <a:t>testCreateAndShowUsers</a:t>
+            </a:r>
+            <a:r>
+              <a:rPr lang="fr-FR" dirty="0"/>
+              <a:t> </a:t>
+            </a:r>
+            <a:r>
+              <a:rPr lang="fr-FR" dirty="0" smtClean="0"/>
+              <a:t>:</a:t>
+            </a:r>
+          </a:p>
+          <a:p>
+            <a:pPr lvl="1"/>
+            <a:r>
+              <a:rPr lang="fr-FR" dirty="0" smtClean="0"/>
+              <a:t>Le fichier </a:t>
+            </a:r>
+            <a:r>
+              <a:rPr lang="fr-FR" dirty="0"/>
+              <a:t>d’entrée des tests de la méthode </a:t>
+            </a:r>
+            <a:r>
               <a:rPr lang="fr-FR" dirty="0" err="1" smtClean="0"/>
-              <a:t>testRun</a:t>
-            </a:r>
-            <a:r>
-              <a:rPr lang="fr-FR" dirty="0" smtClean="0"/>
-              <a:t> :</a:t>
-            </a:r>
-          </a:p>
-          <a:p>
-            <a:pPr lvl="1"/>
-            <a:r>
-              <a:rPr lang="fr-FR" dirty="0" smtClean="0"/>
-              <a:t>Les </a:t>
+              <a:t>testCreateAndShowUsers</a:t>
+            </a:r>
+            <a:r>
+              <a:rPr lang="fr-FR" dirty="0" smtClean="0"/>
+              <a:t> est</a:t>
+            </a:r>
+            <a:r>
+              <a:rPr lang="fr-FR" dirty="0" smtClean="0"/>
+              <a:t> </a:t>
             </a:r>
             <a:r>
               <a:rPr lang="fr-FR" dirty="0"/>
-              <a:t>fichiers d’entrée des tests de la méthode </a:t>
-            </a:r>
-            <a:r>
-              <a:rPr lang="fr-FR" dirty="0" err="1"/>
-              <a:t>testRun</a:t>
-            </a:r>
-            <a:r>
-              <a:rPr lang="fr-FR" dirty="0"/>
-              <a:t> sont dans </a:t>
+              <a:t>dans </a:t>
             </a:r>
             <a:r>
               <a:rPr lang="fr-FR" dirty="0" err="1"/>
@@ -5870,40 +5890,32 @@
             </a:r>
             <a:r>
               <a:rPr lang="fr-FR" dirty="0"/>
-              <a:t> – bin – tests</a:t>
+              <a:t> – </a:t>
+            </a:r>
+            <a:r>
+              <a:rPr lang="fr-FR" dirty="0" err="1" smtClean="0"/>
+              <a:t>src</a:t>
+            </a:r>
+            <a:r>
+              <a:rPr lang="fr-FR" dirty="0" smtClean="0"/>
+              <a:t> – </a:t>
+            </a:r>
+            <a:r>
+              <a:rPr lang="fr-FR" dirty="0" err="1" smtClean="0"/>
+              <a:t>easybid</a:t>
+            </a:r>
+            <a:r>
+              <a:rPr lang="fr-FR" dirty="0" smtClean="0"/>
+              <a:t> </a:t>
+            </a:r>
+            <a:r>
+              <a:rPr lang="fr-FR" dirty="0"/>
+              <a:t>– tests</a:t>
             </a:r>
             <a:r>
               <a:rPr lang="fr-FR" dirty="0" smtClean="0"/>
               <a:t>.</a:t>
             </a:r>
-          </a:p>
-          <a:p>
-            <a:pPr lvl="1"/>
-            <a:r>
-              <a:rPr lang="fr-FR" dirty="0" smtClean="0"/>
-              <a:t>La méthode </a:t>
-            </a:r>
-            <a:r>
-              <a:rPr lang="fr-FR" dirty="0" err="1" smtClean="0"/>
-              <a:t>testRun</a:t>
-            </a:r>
-            <a:r>
-              <a:rPr lang="fr-FR" dirty="0" smtClean="0"/>
-              <a:t> appelle </a:t>
-            </a:r>
-            <a:r>
-              <a:rPr lang="fr-FR" dirty="0" err="1" smtClean="0"/>
-              <a:t>plusieures</a:t>
-            </a:r>
-            <a:r>
-              <a:rPr lang="fr-FR" dirty="0"/>
-              <a:t> </a:t>
-            </a:r>
-            <a:r>
-              <a:rPr lang="fr-FR" dirty="0" smtClean="0"/>
-              <a:t>méthodes pour effectuer les tests sur chacun des fichiers d’entrée.</a:t>
-            </a:r>
-            <a:endParaRPr lang="fr-FR" dirty="0"/>
           </a:p>
           <a:p>
             <a:pPr lvl="1"/>
@@ -6240,23 +6252,7 @@
                   <a:srgbClr val="18579B"/>
                 </a:solidFill>
               </a:rPr>
-              <a:t>	I) Architecture de notre </a:t>
-            </a:r>
-            <a:r>
-              <a:rPr lang="fr-FR" sz="2300" b="1" dirty="0" smtClean="0">
-                <a:solidFill>
-                  <a:srgbClr val="18579B"/>
-                </a:solidFill>
-              </a:rPr>
-              <a:t>système </a:t>
-            </a:r>
-            <a:r>
-              <a:rPr lang="fr-FR" sz="2300" b="1" dirty="0" smtClean="0">
-                <a:solidFill>
-                  <a:srgbClr val="18579B"/>
-                </a:solidFill>
-              </a:rPr>
-              <a:t>d’enchères</a:t>
+              <a:t>	I) Architecture de notre système d’enchères</a:t>
             </a:r>
           </a:p>
           <a:p>
@@ -7670,15 +7666,7 @@
           <a:p>
             <a:r>
               <a:rPr lang="fr-FR" sz="4000" dirty="0" smtClean="0"/>
-              <a:t>I) Architecture de notre </a:t>
-            </a:r>
-            <a:r>
-              <a:rPr lang="fr-FR" sz="4000" dirty="0" smtClean="0"/>
-              <a:t>système </a:t>
-            </a:r>
-            <a:r>
-              <a:rPr lang="fr-FR" sz="4000" dirty="0" smtClean="0"/>
-              <a:t>d’enchères</a:t>
+              <a:t>I) Architecture de notre système d’enchères</a:t>
             </a:r>
             <a:endParaRPr lang="fr-FR" sz="4000" dirty="0"/>
           </a:p>
@@ -8674,15 +8662,7 @@
                   <a:schemeClr val="tx1"/>
                 </a:solidFill>
               </a:rPr>
-              <a:t>Cette classe </a:t>
-            </a:r>
-            <a:r>
-              <a:rPr lang="fr-FR" dirty="0" smtClean="0">
-                <a:solidFill>
-                  <a:schemeClr val="tx1"/>
-                </a:solidFill>
-              </a:rPr>
-              <a:t>s’occupe de la gestion du temps de notre logiciel. Elle possède deux types instances, les instances à date fixe et les instances pour laquelle la date est mise à jour avant chaque utilisation/lecture.</a:t>
+              <a:t>Cette classe s’occupe de la gestion du temps de notre logiciel. Elle possède deux types instances, les instances à date fixe et les instances pour laquelle la date est mise à jour avant chaque utilisation/lecture.</a:t>
             </a:r>
           </a:p>
           <a:p>

</xml_diff>